<commit_message>
revised caption in final viz output
</commit_message>
<xml_diff>
--- a/Washington B1G Head-to-Head Series/annotation layer.pptx
+++ b/Washington B1G Head-to-Head Series/annotation layer.pptx
@@ -104,7 +104,65 @@
       </a:defRPr>
     </a:lvl9pPr>
   </p:defaultTextStyle>
+  <p:extLst>
+    <p:ext uri="{EFAFB233-063F-42B5-8137-9DF3F51BA10A}">
+      <p15:sldGuideLst xmlns:p15="http://schemas.microsoft.com/office/powerpoint/2012/main"/>
+    </p:ext>
+  </p:extLst>
 </p:presentation>
+</file>
+
+<file path=ppt/revisionInfo.xml><?xml version="1.0" encoding="utf-8"?>
+<p1510:revInfo xmlns:a="http://schemas.openxmlformats.org/drawingml/2006/main" xmlns:r="http://schemas.openxmlformats.org/officeDocument/2006/relationships" xmlns:p1510="http://schemas.microsoft.com/office/powerpoint/2015/10/main">
+  <p1510:revLst>
+    <p1510:client id="{9BB6D6A5-2459-4C17-90D2-3CB2405FE729}" v="2" dt="2023-10-08T20:18:26.028"/>
+  </p1510:revLst>
+</p1510:revInfo>
+</file>
+
+<file path=ppt/changesInfos/changesInfo1.xml><?xml version="1.0" encoding="utf-8"?>
+<pc:chgInfo xmlns:a="http://schemas.openxmlformats.org/drawingml/2006/main" xmlns:r="http://schemas.openxmlformats.org/officeDocument/2006/relationships" xmlns:ac="http://schemas.microsoft.com/office/drawing/2013/main/command" xmlns:pc="http://schemas.microsoft.com/office/powerpoint/2013/main/command">
+  <pc:docChgLst>
+    <pc:chgData name="Alexander Elfering" userId="4911788d8c382ac3" providerId="LiveId" clId="{9BB6D6A5-2459-4C17-90D2-3CB2405FE729}"/>
+    <pc:docChg chg="custSel modSld">
+      <pc:chgData name="Alexander Elfering" userId="4911788d8c382ac3" providerId="LiveId" clId="{9BB6D6A5-2459-4C17-90D2-3CB2405FE729}" dt="2023-10-08T20:18:37.778" v="5" actId="478"/>
+      <pc:docMkLst>
+        <pc:docMk/>
+      </pc:docMkLst>
+      <pc:sldChg chg="addSp delSp modSp mod">
+        <pc:chgData name="Alexander Elfering" userId="4911788d8c382ac3" providerId="LiveId" clId="{9BB6D6A5-2459-4C17-90D2-3CB2405FE729}" dt="2023-10-08T20:18:37.778" v="5" actId="478"/>
+        <pc:sldMkLst>
+          <pc:docMk/>
+          <pc:sldMk cId="697849773" sldId="257"/>
+        </pc:sldMkLst>
+        <pc:picChg chg="del">
+          <ac:chgData name="Alexander Elfering" userId="4911788d8c382ac3" providerId="LiveId" clId="{9BB6D6A5-2459-4C17-90D2-3CB2405FE729}" dt="2023-10-08T20:18:37.778" v="5" actId="478"/>
+          <ac:picMkLst>
+            <pc:docMk/>
+            <pc:sldMk cId="697849773" sldId="257"/>
+            <ac:picMk id="3" creationId="{AFA8778F-6C1D-8DCA-7653-BE992DE95902}"/>
+          </ac:picMkLst>
+        </pc:picChg>
+        <pc:picChg chg="add del mod">
+          <ac:chgData name="Alexander Elfering" userId="4911788d8c382ac3" providerId="LiveId" clId="{9BB6D6A5-2459-4C17-90D2-3CB2405FE729}" dt="2023-10-08T20:18:20.274" v="1" actId="478"/>
+          <ac:picMkLst>
+            <pc:docMk/>
+            <pc:sldMk cId="697849773" sldId="257"/>
+            <ac:picMk id="19" creationId="{3A2DE67F-941F-B0DC-41BB-66538BE9EBA7}"/>
+          </ac:picMkLst>
+        </pc:picChg>
+        <pc:picChg chg="add mod ord">
+          <ac:chgData name="Alexander Elfering" userId="4911788d8c382ac3" providerId="LiveId" clId="{9BB6D6A5-2459-4C17-90D2-3CB2405FE729}" dt="2023-10-08T20:18:32.842" v="4" actId="167"/>
+          <ac:picMkLst>
+            <pc:docMk/>
+            <pc:sldMk cId="697849773" sldId="257"/>
+            <ac:picMk id="34" creationId="{198075A5-E598-3FDB-A640-DFC9CA26A5C0}"/>
+          </ac:picMkLst>
+        </pc:picChg>
+      </pc:sldChg>
+    </pc:docChg>
+  </pc:docChgLst>
+</pc:chgInfo>
 </file>
 
 <file path=ppt/slideLayouts/slideLayout1.xml><?xml version="1.0" encoding="utf-8"?>
@@ -238,7 +296,7 @@
           <a:p>
             <a:fld id="{FEFDC3FF-42A1-4D68-A210-16A4C6C0AABE}" type="datetimeFigureOut">
               <a:rPr lang="en-US" smtClean="0"/>
-              <a:t>10/6/2023</a:t>
+              <a:t>10/8/2023</a:t>
             </a:fld>
             <a:endParaRPr lang="en-US"/>
           </a:p>
@@ -408,7 +466,7 @@
           <a:p>
             <a:fld id="{FEFDC3FF-42A1-4D68-A210-16A4C6C0AABE}" type="datetimeFigureOut">
               <a:rPr lang="en-US" smtClean="0"/>
-              <a:t>10/6/2023</a:t>
+              <a:t>10/8/2023</a:t>
             </a:fld>
             <a:endParaRPr lang="en-US"/>
           </a:p>
@@ -588,7 +646,7 @@
           <a:p>
             <a:fld id="{FEFDC3FF-42A1-4D68-A210-16A4C6C0AABE}" type="datetimeFigureOut">
               <a:rPr lang="en-US" smtClean="0"/>
-              <a:t>10/6/2023</a:t>
+              <a:t>10/8/2023</a:t>
             </a:fld>
             <a:endParaRPr lang="en-US"/>
           </a:p>
@@ -758,7 +816,7 @@
           <a:p>
             <a:fld id="{FEFDC3FF-42A1-4D68-A210-16A4C6C0AABE}" type="datetimeFigureOut">
               <a:rPr lang="en-US" smtClean="0"/>
-              <a:t>10/6/2023</a:t>
+              <a:t>10/8/2023</a:t>
             </a:fld>
             <a:endParaRPr lang="en-US"/>
           </a:p>
@@ -1004,7 +1062,7 @@
           <a:p>
             <a:fld id="{FEFDC3FF-42A1-4D68-A210-16A4C6C0AABE}" type="datetimeFigureOut">
               <a:rPr lang="en-US" smtClean="0"/>
-              <a:t>10/6/2023</a:t>
+              <a:t>10/8/2023</a:t>
             </a:fld>
             <a:endParaRPr lang="en-US"/>
           </a:p>
@@ -1236,7 +1294,7 @@
           <a:p>
             <a:fld id="{FEFDC3FF-42A1-4D68-A210-16A4C6C0AABE}" type="datetimeFigureOut">
               <a:rPr lang="en-US" smtClean="0"/>
-              <a:t>10/6/2023</a:t>
+              <a:t>10/8/2023</a:t>
             </a:fld>
             <a:endParaRPr lang="en-US"/>
           </a:p>
@@ -1603,7 +1661,7 @@
           <a:p>
             <a:fld id="{FEFDC3FF-42A1-4D68-A210-16A4C6C0AABE}" type="datetimeFigureOut">
               <a:rPr lang="en-US" smtClean="0"/>
-              <a:t>10/6/2023</a:t>
+              <a:t>10/8/2023</a:t>
             </a:fld>
             <a:endParaRPr lang="en-US"/>
           </a:p>
@@ -1721,7 +1779,7 @@
           <a:p>
             <a:fld id="{FEFDC3FF-42A1-4D68-A210-16A4C6C0AABE}" type="datetimeFigureOut">
               <a:rPr lang="en-US" smtClean="0"/>
-              <a:t>10/6/2023</a:t>
+              <a:t>10/8/2023</a:t>
             </a:fld>
             <a:endParaRPr lang="en-US"/>
           </a:p>
@@ -1816,7 +1874,7 @@
           <a:p>
             <a:fld id="{FEFDC3FF-42A1-4D68-A210-16A4C6C0AABE}" type="datetimeFigureOut">
               <a:rPr lang="en-US" smtClean="0"/>
-              <a:t>10/6/2023</a:t>
+              <a:t>10/8/2023</a:t>
             </a:fld>
             <a:endParaRPr lang="en-US"/>
           </a:p>
@@ -2093,7 +2151,7 @@
           <a:p>
             <a:fld id="{FEFDC3FF-42A1-4D68-A210-16A4C6C0AABE}" type="datetimeFigureOut">
               <a:rPr lang="en-US" smtClean="0"/>
-              <a:t>10/6/2023</a:t>
+              <a:t>10/8/2023</a:t>
             </a:fld>
             <a:endParaRPr lang="en-US"/>
           </a:p>
@@ -2350,7 +2408,7 @@
           <a:p>
             <a:fld id="{FEFDC3FF-42A1-4D68-A210-16A4C6C0AABE}" type="datetimeFigureOut">
               <a:rPr lang="en-US" smtClean="0"/>
-              <a:t>10/6/2023</a:t>
+              <a:t>10/8/2023</a:t>
             </a:fld>
             <a:endParaRPr lang="en-US"/>
           </a:p>
@@ -2563,7 +2621,7 @@
           <a:p>
             <a:fld id="{FEFDC3FF-42A1-4D68-A210-16A4C6C0AABE}" type="datetimeFigureOut">
               <a:rPr lang="en-US" smtClean="0"/>
-              <a:t>10/6/2023</a:t>
+              <a:t>10/8/2023</a:t>
             </a:fld>
             <a:endParaRPr lang="en-US"/>
           </a:p>
@@ -2970,10 +3028,10 @@
       </p:grpSpPr>
       <p:pic>
         <p:nvPicPr>
-          <p:cNvPr id="3" name="Picture 2" descr="A screenshot of a graph&#10;&#10;Description automatically generated">
+          <p:cNvPr id="34" name="Picture 33" descr="A screenshot of a graph&#10;&#10;Description automatically generated">
             <a:extLst>
               <a:ext uri="{FF2B5EF4-FFF2-40B4-BE49-F238E27FC236}">
-                <a16:creationId xmlns:a16="http://schemas.microsoft.com/office/drawing/2014/main" id="{AFA8778F-6C1D-8DCA-7653-BE992DE95902}"/>
+                <a16:creationId xmlns:a16="http://schemas.microsoft.com/office/drawing/2014/main" id="{198075A5-E598-3FDB-A640-DFC9CA26A5C0}"/>
               </a:ext>
             </a:extLst>
           </p:cNvPr>

</xml_diff>